<commit_message>
Criacao de um registrador que joga para arquivo exclusao da pasta bin
</commit_message>
<xml_diff>
--- a/Documentacao/Diagramas.pptx
+++ b/Documentacao/Diagramas.pptx
@@ -293,7 +293,7 @@
           <a:p>
             <a:fld id="{D2633295-9948-4DEF-8356-801A7F6E12CE}" type="datetimeFigureOut">
               <a:rPr lang="pt-BR" smtClean="0"/>
-              <a:t>04/05/2013</a:t>
+              <a:t>05/05/2013</a:t>
             </a:fld>
             <a:endParaRPr lang="pt-BR"/>
           </a:p>
@@ -463,7 +463,7 @@
           <a:p>
             <a:fld id="{D2633295-9948-4DEF-8356-801A7F6E12CE}" type="datetimeFigureOut">
               <a:rPr lang="pt-BR" smtClean="0"/>
-              <a:t>04/05/2013</a:t>
+              <a:t>05/05/2013</a:t>
             </a:fld>
             <a:endParaRPr lang="pt-BR"/>
           </a:p>
@@ -643,7 +643,7 @@
           <a:p>
             <a:fld id="{D2633295-9948-4DEF-8356-801A7F6E12CE}" type="datetimeFigureOut">
               <a:rPr lang="pt-BR" smtClean="0"/>
-              <a:t>04/05/2013</a:t>
+              <a:t>05/05/2013</a:t>
             </a:fld>
             <a:endParaRPr lang="pt-BR"/>
           </a:p>
@@ -813,7 +813,7 @@
           <a:p>
             <a:fld id="{D2633295-9948-4DEF-8356-801A7F6E12CE}" type="datetimeFigureOut">
               <a:rPr lang="pt-BR" smtClean="0"/>
-              <a:t>04/05/2013</a:t>
+              <a:t>05/05/2013</a:t>
             </a:fld>
             <a:endParaRPr lang="pt-BR"/>
           </a:p>
@@ -1059,7 +1059,7 @@
           <a:p>
             <a:fld id="{D2633295-9948-4DEF-8356-801A7F6E12CE}" type="datetimeFigureOut">
               <a:rPr lang="pt-BR" smtClean="0"/>
-              <a:t>04/05/2013</a:t>
+              <a:t>05/05/2013</a:t>
             </a:fld>
             <a:endParaRPr lang="pt-BR"/>
           </a:p>
@@ -1347,7 +1347,7 @@
           <a:p>
             <a:fld id="{D2633295-9948-4DEF-8356-801A7F6E12CE}" type="datetimeFigureOut">
               <a:rPr lang="pt-BR" smtClean="0"/>
-              <a:t>04/05/2013</a:t>
+              <a:t>05/05/2013</a:t>
             </a:fld>
             <a:endParaRPr lang="pt-BR"/>
           </a:p>
@@ -1769,7 +1769,7 @@
           <a:p>
             <a:fld id="{D2633295-9948-4DEF-8356-801A7F6E12CE}" type="datetimeFigureOut">
               <a:rPr lang="pt-BR" smtClean="0"/>
-              <a:t>04/05/2013</a:t>
+              <a:t>05/05/2013</a:t>
             </a:fld>
             <a:endParaRPr lang="pt-BR"/>
           </a:p>
@@ -1887,7 +1887,7 @@
           <a:p>
             <a:fld id="{D2633295-9948-4DEF-8356-801A7F6E12CE}" type="datetimeFigureOut">
               <a:rPr lang="pt-BR" smtClean="0"/>
-              <a:t>04/05/2013</a:t>
+              <a:t>05/05/2013</a:t>
             </a:fld>
             <a:endParaRPr lang="pt-BR"/>
           </a:p>
@@ -1982,7 +1982,7 @@
           <a:p>
             <a:fld id="{D2633295-9948-4DEF-8356-801A7F6E12CE}" type="datetimeFigureOut">
               <a:rPr lang="pt-BR" smtClean="0"/>
-              <a:t>04/05/2013</a:t>
+              <a:t>05/05/2013</a:t>
             </a:fld>
             <a:endParaRPr lang="pt-BR"/>
           </a:p>
@@ -2259,7 +2259,7 @@
           <a:p>
             <a:fld id="{D2633295-9948-4DEF-8356-801A7F6E12CE}" type="datetimeFigureOut">
               <a:rPr lang="pt-BR" smtClean="0"/>
-              <a:t>04/05/2013</a:t>
+              <a:t>05/05/2013</a:t>
             </a:fld>
             <a:endParaRPr lang="pt-BR"/>
           </a:p>
@@ -2512,7 +2512,7 @@
           <a:p>
             <a:fld id="{D2633295-9948-4DEF-8356-801A7F6E12CE}" type="datetimeFigureOut">
               <a:rPr lang="pt-BR" smtClean="0"/>
-              <a:t>04/05/2013</a:t>
+              <a:t>05/05/2013</a:t>
             </a:fld>
             <a:endParaRPr lang="pt-BR"/>
           </a:p>
@@ -2725,7 +2725,7 @@
           <a:p>
             <a:fld id="{D2633295-9948-4DEF-8356-801A7F6E12CE}" type="datetimeFigureOut">
               <a:rPr lang="pt-BR" smtClean="0"/>
-              <a:t>04/05/2013</a:t>
+              <a:t>05/05/2013</a:t>
             </a:fld>
             <a:endParaRPr lang="pt-BR"/>
           </a:p>
@@ -7837,8 +7837,8 @@
         </p:nvSpPr>
         <p:spPr>
           <a:xfrm>
-            <a:off x="4499992" y="1820072"/>
-            <a:ext cx="4392488" cy="2031325"/>
+            <a:off x="4427984" y="1556792"/>
+            <a:ext cx="4644008" cy="1754326"/>
           </a:xfrm>
           <a:prstGeom prst="rect">
             <a:avLst/>
@@ -7947,6 +7947,222 @@
           </a:fontRef>
         </p:style>
       </p:cxnSp>
+      <p:sp>
+        <p:nvSpPr>
+          <p:cNvPr id="17" name="Retângulo 16"/>
+          <p:cNvSpPr/>
+          <p:nvPr/>
+        </p:nvSpPr>
+        <p:spPr>
+          <a:xfrm>
+            <a:off x="6106050" y="3933056"/>
+            <a:ext cx="2448272" cy="457200"/>
+          </a:xfrm>
+          <a:prstGeom prst="rect">
+            <a:avLst/>
+          </a:prstGeom>
+        </p:spPr>
+        <p:style>
+          <a:lnRef idx="3">
+            <a:schemeClr val="lt1"/>
+          </a:lnRef>
+          <a:fillRef idx="1">
+            <a:schemeClr val="accent4"/>
+          </a:fillRef>
+          <a:effectRef idx="1">
+            <a:schemeClr val="accent4"/>
+          </a:effectRef>
+          <a:fontRef idx="minor">
+            <a:schemeClr val="lt1"/>
+          </a:fontRef>
+        </p:style>
+        <p:txBody>
+          <a:bodyPr rtlCol="0" anchor="ctr"/>
+          <a:lstStyle/>
+          <a:p>
+            <a:pPr algn="ctr"/>
+            <a:r>
+              <a:rPr lang="pt-BR" sz="1400" dirty="0" err="1" smtClean="0"/>
+              <a:t>RegistroCVSFile</a:t>
+            </a:r>
+            <a:endParaRPr lang="pt-BR" sz="1400" dirty="0"/>
+          </a:p>
+        </p:txBody>
+      </p:sp>
+      <p:sp>
+        <p:nvSpPr>
+          <p:cNvPr id="18" name="Retângulo 17"/>
+          <p:cNvSpPr/>
+          <p:nvPr/>
+        </p:nvSpPr>
+        <p:spPr>
+          <a:xfrm>
+            <a:off x="6106050" y="4390256"/>
+            <a:ext cx="2448272" cy="457200"/>
+          </a:xfrm>
+          <a:prstGeom prst="rect">
+            <a:avLst/>
+          </a:prstGeom>
+        </p:spPr>
+        <p:style>
+          <a:lnRef idx="3">
+            <a:schemeClr val="lt1"/>
+          </a:lnRef>
+          <a:fillRef idx="1">
+            <a:schemeClr val="accent4"/>
+          </a:fillRef>
+          <a:effectRef idx="1">
+            <a:schemeClr val="accent4"/>
+          </a:effectRef>
+          <a:fontRef idx="minor">
+            <a:schemeClr val="lt1"/>
+          </a:fontRef>
+        </p:style>
+        <p:txBody>
+          <a:bodyPr rtlCol="0" anchor="ctr"/>
+          <a:lstStyle/>
+          <a:p>
+            <a:pPr algn="ctr"/>
+            <a:endParaRPr lang="pt-BR" i="1" dirty="0"/>
+          </a:p>
+        </p:txBody>
+      </p:sp>
+      <p:sp>
+        <p:nvSpPr>
+          <p:cNvPr id="19" name="Retângulo 18"/>
+          <p:cNvSpPr/>
+          <p:nvPr/>
+        </p:nvSpPr>
+        <p:spPr>
+          <a:xfrm>
+            <a:off x="6106050" y="4847456"/>
+            <a:ext cx="2448272" cy="457200"/>
+          </a:xfrm>
+          <a:prstGeom prst="rect">
+            <a:avLst/>
+          </a:prstGeom>
+        </p:spPr>
+        <p:style>
+          <a:lnRef idx="3">
+            <a:schemeClr val="lt1"/>
+          </a:lnRef>
+          <a:fillRef idx="1">
+            <a:schemeClr val="accent4"/>
+          </a:fillRef>
+          <a:effectRef idx="1">
+            <a:schemeClr val="accent4"/>
+          </a:effectRef>
+          <a:fontRef idx="minor">
+            <a:schemeClr val="lt1"/>
+          </a:fontRef>
+        </p:style>
+        <p:txBody>
+          <a:bodyPr rtlCol="0" anchor="ctr"/>
+          <a:lstStyle/>
+          <a:p>
+            <a:pPr algn="ctr"/>
+            <a:r>
+              <a:rPr lang="pt-BR" sz="1400" dirty="0" smtClean="0"/>
+              <a:t>+Registrar()</a:t>
+            </a:r>
+            <a:endParaRPr lang="pt-BR" sz="1400" dirty="0"/>
+          </a:p>
+        </p:txBody>
+      </p:sp>
+      <p:cxnSp>
+        <p:nvCxnSpPr>
+          <p:cNvPr id="20" name="Conector de seta reta 19"/>
+          <p:cNvCxnSpPr>
+            <a:stCxn id="17" idx="0"/>
+            <a:endCxn id="39" idx="2"/>
+          </p:cNvCxnSpPr>
+          <p:nvPr/>
+        </p:nvCxnSpPr>
+        <p:spPr>
+          <a:xfrm flipH="1" flipV="1">
+            <a:off x="3059832" y="3216424"/>
+            <a:ext cx="4270354" cy="716632"/>
+          </a:xfrm>
+          <a:prstGeom prst="straightConnector1">
+            <a:avLst/>
+          </a:prstGeom>
+          <a:ln w="63500">
+            <a:tailEnd type="arrow"/>
+          </a:ln>
+        </p:spPr>
+        <p:style>
+          <a:lnRef idx="1">
+            <a:schemeClr val="accent1"/>
+          </a:lnRef>
+          <a:fillRef idx="0">
+            <a:schemeClr val="accent1"/>
+          </a:fillRef>
+          <a:effectRef idx="0">
+            <a:schemeClr val="accent1"/>
+          </a:effectRef>
+          <a:fontRef idx="minor">
+            <a:schemeClr val="tx1"/>
+          </a:fontRef>
+        </p:style>
+      </p:cxnSp>
+      <p:sp>
+        <p:nvSpPr>
+          <p:cNvPr id="22" name="CaixaDeTexto 21"/>
+          <p:cNvSpPr txBox="1"/>
+          <p:nvPr/>
+        </p:nvSpPr>
+        <p:spPr>
+          <a:xfrm>
+            <a:off x="6164560" y="5475878"/>
+            <a:ext cx="2736304" cy="1200329"/>
+          </a:xfrm>
+          <a:prstGeom prst="rect">
+            <a:avLst/>
+          </a:prstGeom>
+          <a:noFill/>
+        </p:spPr>
+        <p:txBody>
+          <a:bodyPr wrap="square" rtlCol="0">
+            <a:spAutoFit/>
+          </a:bodyPr>
+          <a:lstStyle/>
+          <a:p>
+            <a:r>
+              <a:rPr lang="pt-BR" sz="1200" dirty="0" smtClean="0"/>
+              <a:t>Implementa o registrar() </a:t>
+            </a:r>
+            <a:r>
+              <a:rPr lang="pt-BR" sz="1200" dirty="0" smtClean="0"/>
+              <a:t>gerando um </a:t>
+            </a:r>
+            <a:r>
+              <a:rPr lang="pt-BR" sz="1200" dirty="0" err="1" smtClean="0"/>
+              <a:t>diretorio</a:t>
+            </a:r>
+            <a:r>
+              <a:rPr lang="pt-BR" sz="1200" dirty="0" smtClean="0"/>
+              <a:t> chamado </a:t>
+            </a:r>
+            <a:r>
+              <a:rPr lang="pt-BR" sz="1200" dirty="0" err="1" smtClean="0"/>
+              <a:t>Ligacoes</a:t>
+            </a:r>
+            <a:r>
+              <a:rPr lang="pt-BR" sz="1200" dirty="0" smtClean="0"/>
+              <a:t> com um arquivo Ligacoes.txt com as informações das </a:t>
+            </a:r>
+            <a:r>
+              <a:rPr lang="pt-BR" sz="1200" dirty="0" err="1" smtClean="0"/>
+              <a:t>ligacoes</a:t>
+            </a:r>
+            <a:r>
+              <a:rPr lang="pt-BR" sz="1200" dirty="0" smtClean="0"/>
+              <a:t> e um arquivo para cada portaria encontrada com o texto da portaria.</a:t>
+            </a:r>
+            <a:endParaRPr lang="pt-BR" sz="1200" dirty="0"/>
+          </a:p>
+        </p:txBody>
+      </p:sp>
     </p:spTree>
     <p:extLst>
       <p:ext uri="{BB962C8B-B14F-4D97-AF65-F5344CB8AC3E}">

</xml_diff>